<commit_message>
Diagrams updated for distancing using individual scoreboards
</commit_message>
<xml_diff>
--- a/docs/img/PublicResults/CloudExplained.pptx
+++ b/docs/img/PublicResults/CloudExplained.pptx
@@ -14,6 +14,7 @@
     <p:sldId id="264" r:id="rId8"/>
     <p:sldId id="263" r:id="rId9"/>
     <p:sldId id="265" r:id="rId10"/>
+    <p:sldId id="266" r:id="rId11"/>
   </p:sldIdLst>
   <p:sldSz cx="12192000" cy="6858000"/>
   <p:notesSz cx="6858000" cy="9144000"/>
@@ -280,7 +281,7 @@
           <a:p>
             <a:fld id="{DFF2FBC3-E573-4B2D-B1C4-960EEBA08826}" type="datetimeFigureOut">
               <a:rPr lang="fr-CA" smtClean="0"/>
-              <a:t>2020-07-31</a:t>
+              <a:t>2020-08-05</a:t>
             </a:fld>
             <a:endParaRPr lang="fr-CA"/>
           </a:p>
@@ -480,7 +481,7 @@
           <a:p>
             <a:fld id="{DFF2FBC3-E573-4B2D-B1C4-960EEBA08826}" type="datetimeFigureOut">
               <a:rPr lang="fr-CA" smtClean="0"/>
-              <a:t>2020-07-31</a:t>
+              <a:t>2020-08-05</a:t>
             </a:fld>
             <a:endParaRPr lang="fr-CA"/>
           </a:p>
@@ -690,7 +691,7 @@
           <a:p>
             <a:fld id="{DFF2FBC3-E573-4B2D-B1C4-960EEBA08826}" type="datetimeFigureOut">
               <a:rPr lang="fr-CA" smtClean="0"/>
-              <a:t>2020-07-31</a:t>
+              <a:t>2020-08-05</a:t>
             </a:fld>
             <a:endParaRPr lang="fr-CA"/>
           </a:p>
@@ -890,7 +891,7 @@
           <a:p>
             <a:fld id="{DFF2FBC3-E573-4B2D-B1C4-960EEBA08826}" type="datetimeFigureOut">
               <a:rPr lang="fr-CA" smtClean="0"/>
-              <a:t>2020-07-31</a:t>
+              <a:t>2020-08-05</a:t>
             </a:fld>
             <a:endParaRPr lang="fr-CA"/>
           </a:p>
@@ -1166,7 +1167,7 @@
           <a:p>
             <a:fld id="{DFF2FBC3-E573-4B2D-B1C4-960EEBA08826}" type="datetimeFigureOut">
               <a:rPr lang="fr-CA" smtClean="0"/>
-              <a:t>2020-07-31</a:t>
+              <a:t>2020-08-05</a:t>
             </a:fld>
             <a:endParaRPr lang="fr-CA"/>
           </a:p>
@@ -1434,7 +1435,7 @@
           <a:p>
             <a:fld id="{DFF2FBC3-E573-4B2D-B1C4-960EEBA08826}" type="datetimeFigureOut">
               <a:rPr lang="fr-CA" smtClean="0"/>
-              <a:t>2020-07-31</a:t>
+              <a:t>2020-08-05</a:t>
             </a:fld>
             <a:endParaRPr lang="fr-CA"/>
           </a:p>
@@ -1849,7 +1850,7 @@
           <a:p>
             <a:fld id="{DFF2FBC3-E573-4B2D-B1C4-960EEBA08826}" type="datetimeFigureOut">
               <a:rPr lang="fr-CA" smtClean="0"/>
-              <a:t>2020-07-31</a:t>
+              <a:t>2020-08-05</a:t>
             </a:fld>
             <a:endParaRPr lang="fr-CA"/>
           </a:p>
@@ -1991,7 +1992,7 @@
           <a:p>
             <a:fld id="{DFF2FBC3-E573-4B2D-B1C4-960EEBA08826}" type="datetimeFigureOut">
               <a:rPr lang="fr-CA" smtClean="0"/>
-              <a:t>2020-07-31</a:t>
+              <a:t>2020-08-05</a:t>
             </a:fld>
             <a:endParaRPr lang="fr-CA"/>
           </a:p>
@@ -2104,7 +2105,7 @@
           <a:p>
             <a:fld id="{DFF2FBC3-E573-4B2D-B1C4-960EEBA08826}" type="datetimeFigureOut">
               <a:rPr lang="fr-CA" smtClean="0"/>
-              <a:t>2020-07-31</a:t>
+              <a:t>2020-08-05</a:t>
             </a:fld>
             <a:endParaRPr lang="fr-CA"/>
           </a:p>
@@ -2417,7 +2418,7 @@
           <a:p>
             <a:fld id="{DFF2FBC3-E573-4B2D-B1C4-960EEBA08826}" type="datetimeFigureOut">
               <a:rPr lang="fr-CA" smtClean="0"/>
-              <a:t>2020-07-31</a:t>
+              <a:t>2020-08-05</a:t>
             </a:fld>
             <a:endParaRPr lang="fr-CA"/>
           </a:p>
@@ -2706,7 +2707,7 @@
           <a:p>
             <a:fld id="{DFF2FBC3-E573-4B2D-B1C4-960EEBA08826}" type="datetimeFigureOut">
               <a:rPr lang="fr-CA" smtClean="0"/>
-              <a:t>2020-07-31</a:t>
+              <a:t>2020-08-05</a:t>
             </a:fld>
             <a:endParaRPr lang="fr-CA"/>
           </a:p>
@@ -2949,7 +2950,7 @@
           <a:p>
             <a:fld id="{DFF2FBC3-E573-4B2D-B1C4-960EEBA08826}" type="datetimeFigureOut">
               <a:rPr lang="fr-CA" smtClean="0"/>
-              <a:t>2020-07-31</a:t>
+              <a:t>2020-08-05</a:t>
             </a:fld>
             <a:endParaRPr lang="fr-CA"/>
           </a:p>
@@ -4356,6 +4357,1587 @@
 </p:sld>
 </file>
 
+<file path=ppt/slides/slide10.xml><?xml version="1.0" encoding="utf-8"?>
+<p:sld xmlns:a="http://schemas.openxmlformats.org/drawingml/2006/main" xmlns:r="http://schemas.openxmlformats.org/officeDocument/2006/relationships" xmlns:p="http://schemas.openxmlformats.org/presentationml/2006/main">
+  <p:cSld>
+    <p:spTree>
+      <p:nvGrpSpPr>
+        <p:cNvPr id="1" name=""/>
+        <p:cNvGrpSpPr/>
+        <p:nvPr/>
+      </p:nvGrpSpPr>
+      <p:grpSpPr>
+        <a:xfrm>
+          <a:off x="0" y="0"/>
+          <a:ext cx="0" cy="0"/>
+          <a:chOff x="0" y="0"/>
+          <a:chExt cx="0" cy="0"/>
+        </a:xfrm>
+      </p:grpSpPr>
+      <p:pic>
+        <p:nvPicPr>
+          <p:cNvPr id="7" name="Graphic 6" descr="Server">
+            <a:extLst>
+              <a:ext uri="{FF2B5EF4-FFF2-40B4-BE49-F238E27FC236}">
+                <a16:creationId xmlns:a16="http://schemas.microsoft.com/office/drawing/2014/main" id="{7D55334A-D93B-4BAF-8E4F-96CBFF08AB29}"/>
+              </a:ext>
+            </a:extLst>
+          </p:cNvPr>
+          <p:cNvPicPr>
+            <a:picLocks noChangeAspect="1"/>
+          </p:cNvPicPr>
+          <p:nvPr/>
+        </p:nvPicPr>
+        <p:blipFill>
+          <a:blip r:embed="rId2">
+            <a:extLst>
+              <a:ext uri="{28A0092B-C50C-407E-A947-70E740481C1C}">
+                <a14:useLocalDpi xmlns:a14="http://schemas.microsoft.com/office/drawing/2010/main" val="0"/>
+              </a:ext>
+              <a:ext uri="{96DAC541-7B7A-43D3-8B79-37D633B846F1}">
+                <asvg:svgBlip xmlns:asvg="http://schemas.microsoft.com/office/drawing/2016/SVG/main" r:embed="rId3"/>
+              </a:ext>
+            </a:extLst>
+          </a:blip>
+          <a:stretch>
+            <a:fillRect/>
+          </a:stretch>
+        </p:blipFill>
+        <p:spPr>
+          <a:xfrm>
+            <a:off x="7019260" y="3556334"/>
+            <a:ext cx="914400" cy="914400"/>
+          </a:xfrm>
+          <a:prstGeom prst="rect">
+            <a:avLst/>
+          </a:prstGeom>
+        </p:spPr>
+      </p:pic>
+      <p:pic>
+        <p:nvPicPr>
+          <p:cNvPr id="21" name="Graphic 20" descr="Server">
+            <a:extLst>
+              <a:ext uri="{FF2B5EF4-FFF2-40B4-BE49-F238E27FC236}">
+                <a16:creationId xmlns:a16="http://schemas.microsoft.com/office/drawing/2014/main" id="{5177753F-C49E-491E-81CB-B902FC2C3EBE}"/>
+              </a:ext>
+            </a:extLst>
+          </p:cNvPr>
+          <p:cNvPicPr>
+            <a:picLocks noChangeAspect="1"/>
+          </p:cNvPicPr>
+          <p:nvPr/>
+        </p:nvPicPr>
+        <p:blipFill>
+          <a:blip r:embed="rId4">
+            <a:extLst>
+              <a:ext uri="{28A0092B-C50C-407E-A947-70E740481C1C}">
+                <a14:useLocalDpi xmlns:a14="http://schemas.microsoft.com/office/drawing/2010/main" val="0"/>
+              </a:ext>
+              <a:ext uri="{96DAC541-7B7A-43D3-8B79-37D633B846F1}">
+                <asvg:svgBlip xmlns:asvg="http://schemas.microsoft.com/office/drawing/2016/SVG/main" r:embed="rId5"/>
+              </a:ext>
+            </a:extLst>
+          </a:blip>
+          <a:stretch>
+            <a:fillRect/>
+          </a:stretch>
+        </p:blipFill>
+        <p:spPr>
+          <a:xfrm>
+            <a:off x="4745508" y="3556334"/>
+            <a:ext cx="914400" cy="914400"/>
+          </a:xfrm>
+          <a:prstGeom prst="rect">
+            <a:avLst/>
+          </a:prstGeom>
+        </p:spPr>
+      </p:pic>
+      <p:pic>
+        <p:nvPicPr>
+          <p:cNvPr id="37" name="Graphic 36" descr="Laptop">
+            <a:extLst>
+              <a:ext uri="{FF2B5EF4-FFF2-40B4-BE49-F238E27FC236}">
+                <a16:creationId xmlns:a16="http://schemas.microsoft.com/office/drawing/2014/main" id="{B4B10AC0-DA4E-417B-BE77-4DC952874F41}"/>
+              </a:ext>
+            </a:extLst>
+          </p:cNvPr>
+          <p:cNvPicPr>
+            <a:picLocks noChangeAspect="1"/>
+          </p:cNvPicPr>
+          <p:nvPr/>
+        </p:nvPicPr>
+        <p:blipFill>
+          <a:blip r:embed="rId6">
+            <a:extLst>
+              <a:ext uri="{28A0092B-C50C-407E-A947-70E740481C1C}">
+                <a14:useLocalDpi xmlns:a14="http://schemas.microsoft.com/office/drawing/2010/main" val="0"/>
+              </a:ext>
+              <a:ext uri="{96DAC541-7B7A-43D3-8B79-37D633B846F1}">
+                <asvg:svgBlip xmlns:asvg="http://schemas.microsoft.com/office/drawing/2016/SVG/main" r:embed="rId7"/>
+              </a:ext>
+            </a:extLst>
+          </a:blip>
+          <a:stretch>
+            <a:fillRect/>
+          </a:stretch>
+        </p:blipFill>
+        <p:spPr>
+          <a:xfrm>
+            <a:off x="7159690" y="1035372"/>
+            <a:ext cx="914400" cy="914400"/>
+          </a:xfrm>
+          <a:prstGeom prst="rect">
+            <a:avLst/>
+          </a:prstGeom>
+        </p:spPr>
+      </p:pic>
+      <p:pic>
+        <p:nvPicPr>
+          <p:cNvPr id="39" name="Graphic 38" descr="Laptop">
+            <a:extLst>
+              <a:ext uri="{FF2B5EF4-FFF2-40B4-BE49-F238E27FC236}">
+                <a16:creationId xmlns:a16="http://schemas.microsoft.com/office/drawing/2014/main" id="{75167A89-7233-4EE0-8883-B4FD6C2C8082}"/>
+              </a:ext>
+            </a:extLst>
+          </p:cNvPr>
+          <p:cNvPicPr>
+            <a:picLocks noChangeAspect="1"/>
+          </p:cNvPicPr>
+          <p:nvPr/>
+        </p:nvPicPr>
+        <p:blipFill>
+          <a:blip r:embed="rId6">
+            <a:extLst>
+              <a:ext uri="{28A0092B-C50C-407E-A947-70E740481C1C}">
+                <a14:useLocalDpi xmlns:a14="http://schemas.microsoft.com/office/drawing/2010/main" val="0"/>
+              </a:ext>
+              <a:ext uri="{96DAC541-7B7A-43D3-8B79-37D633B846F1}">
+                <asvg:svgBlip xmlns:asvg="http://schemas.microsoft.com/office/drawing/2016/SVG/main" r:embed="rId7"/>
+              </a:ext>
+            </a:extLst>
+          </a:blip>
+          <a:stretch>
+            <a:fillRect/>
+          </a:stretch>
+        </p:blipFill>
+        <p:spPr>
+          <a:xfrm>
+            <a:off x="8777687" y="1056106"/>
+            <a:ext cx="914400" cy="914400"/>
+          </a:xfrm>
+          <a:prstGeom prst="rect">
+            <a:avLst/>
+          </a:prstGeom>
+        </p:spPr>
+      </p:pic>
+      <p:pic>
+        <p:nvPicPr>
+          <p:cNvPr id="40" name="Graphic 39" descr="Laptop">
+            <a:extLst>
+              <a:ext uri="{FF2B5EF4-FFF2-40B4-BE49-F238E27FC236}">
+                <a16:creationId xmlns:a16="http://schemas.microsoft.com/office/drawing/2014/main" id="{2959F963-E321-4DE6-9007-5B95094ED668}"/>
+              </a:ext>
+            </a:extLst>
+          </p:cNvPr>
+          <p:cNvPicPr>
+            <a:picLocks noChangeAspect="1"/>
+          </p:cNvPicPr>
+          <p:nvPr/>
+        </p:nvPicPr>
+        <p:blipFill>
+          <a:blip r:embed="rId6">
+            <a:extLst>
+              <a:ext uri="{28A0092B-C50C-407E-A947-70E740481C1C}">
+                <a14:useLocalDpi xmlns:a14="http://schemas.microsoft.com/office/drawing/2010/main" val="0"/>
+              </a:ext>
+              <a:ext uri="{96DAC541-7B7A-43D3-8B79-37D633B846F1}">
+                <asvg:svgBlip xmlns:asvg="http://schemas.microsoft.com/office/drawing/2016/SVG/main" r:embed="rId7"/>
+              </a:ext>
+            </a:extLst>
+          </a:blip>
+          <a:stretch>
+            <a:fillRect/>
+          </a:stretch>
+        </p:blipFill>
+        <p:spPr>
+          <a:xfrm>
+            <a:off x="10395685" y="1035372"/>
+            <a:ext cx="914400" cy="914400"/>
+          </a:xfrm>
+          <a:prstGeom prst="rect">
+            <a:avLst/>
+          </a:prstGeom>
+        </p:spPr>
+      </p:pic>
+      <p:pic>
+        <p:nvPicPr>
+          <p:cNvPr id="42" name="Graphic 41" descr="Laptop">
+            <a:extLst>
+              <a:ext uri="{FF2B5EF4-FFF2-40B4-BE49-F238E27FC236}">
+                <a16:creationId xmlns:a16="http://schemas.microsoft.com/office/drawing/2014/main" id="{30258E07-778B-4C23-82CB-8374A76FC366}"/>
+              </a:ext>
+            </a:extLst>
+          </p:cNvPr>
+          <p:cNvPicPr>
+            <a:picLocks noChangeAspect="1"/>
+          </p:cNvPicPr>
+          <p:nvPr/>
+        </p:nvPicPr>
+        <p:blipFill>
+          <a:blip r:embed="rId8">
+            <a:extLst>
+              <a:ext uri="{28A0092B-C50C-407E-A947-70E740481C1C}">
+                <a14:useLocalDpi xmlns:a14="http://schemas.microsoft.com/office/drawing/2010/main" val="0"/>
+              </a:ext>
+              <a:ext uri="{96DAC541-7B7A-43D3-8B79-37D633B846F1}">
+                <asvg:svgBlip xmlns:asvg="http://schemas.microsoft.com/office/drawing/2016/SVG/main" r:embed="rId9"/>
+              </a:ext>
+            </a:extLst>
+          </a:blip>
+          <a:stretch>
+            <a:fillRect/>
+          </a:stretch>
+        </p:blipFill>
+        <p:spPr>
+          <a:xfrm>
+            <a:off x="1262975" y="5061201"/>
+            <a:ext cx="914400" cy="914400"/>
+          </a:xfrm>
+          <a:prstGeom prst="rect">
+            <a:avLst/>
+          </a:prstGeom>
+        </p:spPr>
+      </p:pic>
+      <p:sp>
+        <p:nvSpPr>
+          <p:cNvPr id="47" name="Graphic 45" descr="Cloud">
+            <a:extLst>
+              <a:ext uri="{FF2B5EF4-FFF2-40B4-BE49-F238E27FC236}">
+                <a16:creationId xmlns:a16="http://schemas.microsoft.com/office/drawing/2014/main" id="{2C50AF59-EF21-455C-ADD4-67B324FF4541}"/>
+              </a:ext>
+            </a:extLst>
+          </p:cNvPr>
+          <p:cNvSpPr/>
+          <p:nvPr/>
+        </p:nvSpPr>
+        <p:spPr>
+          <a:xfrm>
+            <a:off x="4306574" y="1725836"/>
+            <a:ext cx="5415353" cy="3082249"/>
+          </a:xfrm>
+          <a:custGeom>
+            <a:avLst/>
+            <a:gdLst>
+              <a:gd name="connsiteX0" fmla="*/ 681898 w 4015594"/>
+              <a:gd name="connsiteY0" fmla="*/ 2281741 h 2285550"/>
+              <a:gd name="connsiteX1" fmla="*/ 870545 w 4015594"/>
+              <a:gd name="connsiteY1" fmla="*/ 2285551 h 2285550"/>
+              <a:gd name="connsiteX2" fmla="*/ 3444286 w 4015594"/>
+              <a:gd name="connsiteY2" fmla="*/ 2285551 h 2285550"/>
+              <a:gd name="connsiteX3" fmla="*/ 4015591 w 4015594"/>
+              <a:gd name="connsiteY3" fmla="*/ 1709703 h 2285550"/>
+              <a:gd name="connsiteX4" fmla="*/ 3449048 w 4015594"/>
+              <a:gd name="connsiteY4" fmla="*/ 1138436 h 2285550"/>
+              <a:gd name="connsiteX5" fmla="*/ 3401423 w 4015594"/>
+              <a:gd name="connsiteY5" fmla="*/ 1138436 h 2285550"/>
+              <a:gd name="connsiteX6" fmla="*/ 3101386 w 4015594"/>
+              <a:gd name="connsiteY6" fmla="*/ 557239 h 2285550"/>
+              <a:gd name="connsiteX7" fmla="*/ 2448890 w 4015594"/>
+              <a:gd name="connsiteY7" fmla="*/ 466752 h 2285550"/>
+              <a:gd name="connsiteX8" fmla="*/ 1296117 w 4015594"/>
+              <a:gd name="connsiteY8" fmla="*/ 94148 h 2285550"/>
+              <a:gd name="connsiteX9" fmla="*/ 829559 w 4015594"/>
+              <a:gd name="connsiteY9" fmla="*/ 852610 h 2285550"/>
+              <a:gd name="connsiteX10" fmla="*/ 829559 w 4015594"/>
+              <a:gd name="connsiteY10" fmla="*/ 862135 h 2285550"/>
+              <a:gd name="connsiteX11" fmla="*/ 716535 w 4015594"/>
+              <a:gd name="connsiteY11" fmla="*/ 852929 h 2285550"/>
+              <a:gd name="connsiteX12" fmla="*/ 0 w 4015594"/>
+              <a:gd name="connsiteY12" fmla="*/ 1567799 h 2285550"/>
+              <a:gd name="connsiteX13" fmla="*/ 67507 w 4015594"/>
+              <a:gd name="connsiteY13" fmla="*/ 1872066 h 2285550"/>
+              <a:gd name="connsiteX14" fmla="*/ 681898 w 4015594"/>
+              <a:gd name="connsiteY14" fmla="*/ 2281741 h 2285550"/>
+              <a:gd name="connsiteX15" fmla="*/ 219826 w 4015594"/>
+              <a:gd name="connsiteY15" fmla="*/ 1195710 h 2285550"/>
+              <a:gd name="connsiteX16" fmla="*/ 716507 w 4015594"/>
+              <a:gd name="connsiteY16" fmla="*/ 948169 h 2285550"/>
+              <a:gd name="connsiteX17" fmla="*/ 814138 w 4015594"/>
+              <a:gd name="connsiteY17" fmla="*/ 956118 h 2285550"/>
+              <a:gd name="connsiteX18" fmla="*/ 924776 w 4015594"/>
+              <a:gd name="connsiteY18" fmla="*/ 974215 h 2285550"/>
+              <a:gd name="connsiteX19" fmla="*/ 924776 w 4015594"/>
+              <a:gd name="connsiteY19" fmla="*/ 852591 h 2285550"/>
+              <a:gd name="connsiteX20" fmla="*/ 1690971 w 4015594"/>
+              <a:gd name="connsiteY20" fmla="*/ 95767 h 2285550"/>
+              <a:gd name="connsiteX21" fmla="*/ 2364137 w 4015594"/>
+              <a:gd name="connsiteY21" fmla="*/ 510238 h 2285550"/>
+              <a:gd name="connsiteX22" fmla="*/ 2401960 w 4015594"/>
+              <a:gd name="connsiteY22" fmla="*/ 583909 h 2285550"/>
+              <a:gd name="connsiteX23" fmla="*/ 2480170 w 4015594"/>
+              <a:gd name="connsiteY23" fmla="*/ 556701 h 2285550"/>
+              <a:gd name="connsiteX24" fmla="*/ 3270097 w 4015594"/>
+              <a:gd name="connsiteY24" fmla="*/ 930548 h 2285550"/>
+              <a:gd name="connsiteX25" fmla="*/ 3306169 w 4015594"/>
+              <a:gd name="connsiteY25" fmla="*/ 1138436 h 2285550"/>
+              <a:gd name="connsiteX26" fmla="*/ 3306169 w 4015594"/>
+              <a:gd name="connsiteY26" fmla="*/ 1233686 h 2285550"/>
+              <a:gd name="connsiteX27" fmla="*/ 3449044 w 4015594"/>
+              <a:gd name="connsiteY27" fmla="*/ 1233686 h 2285550"/>
+              <a:gd name="connsiteX28" fmla="*/ 3920293 w 4015594"/>
+              <a:gd name="connsiteY28" fmla="*/ 1719004 h 2285550"/>
+              <a:gd name="connsiteX29" fmla="*/ 3444286 w 4015594"/>
+              <a:gd name="connsiteY29" fmla="*/ 2190301 h 2285550"/>
+              <a:gd name="connsiteX30" fmla="*/ 771947 w 4015594"/>
+              <a:gd name="connsiteY30" fmla="*/ 2190301 h 2285550"/>
+              <a:gd name="connsiteX31" fmla="*/ 687070 w 4015594"/>
+              <a:gd name="connsiteY31" fmla="*/ 2186629 h 2285550"/>
+              <a:gd name="connsiteX32" fmla="*/ 95530 w 4015594"/>
+              <a:gd name="connsiteY32" fmla="*/ 1541782 h 2285550"/>
+              <a:gd name="connsiteX33" fmla="*/ 219811 w 4015594"/>
+              <a:gd name="connsiteY33" fmla="*/ 1195710 h 2285550"/>
+            </a:gdLst>
+            <a:ahLst/>
+            <a:cxnLst>
+              <a:cxn ang="0">
+                <a:pos x="connsiteX0" y="connsiteY0"/>
+              </a:cxn>
+              <a:cxn ang="0">
+                <a:pos x="connsiteX1" y="connsiteY1"/>
+              </a:cxn>
+              <a:cxn ang="0">
+                <a:pos x="connsiteX2" y="connsiteY2"/>
+              </a:cxn>
+              <a:cxn ang="0">
+                <a:pos x="connsiteX3" y="connsiteY3"/>
+              </a:cxn>
+              <a:cxn ang="0">
+                <a:pos x="connsiteX4" y="connsiteY4"/>
+              </a:cxn>
+              <a:cxn ang="0">
+                <a:pos x="connsiteX5" y="connsiteY5"/>
+              </a:cxn>
+              <a:cxn ang="0">
+                <a:pos x="connsiteX6" y="connsiteY6"/>
+              </a:cxn>
+              <a:cxn ang="0">
+                <a:pos x="connsiteX7" y="connsiteY7"/>
+              </a:cxn>
+              <a:cxn ang="0">
+                <a:pos x="connsiteX8" y="connsiteY8"/>
+              </a:cxn>
+              <a:cxn ang="0">
+                <a:pos x="connsiteX9" y="connsiteY9"/>
+              </a:cxn>
+              <a:cxn ang="0">
+                <a:pos x="connsiteX10" y="connsiteY10"/>
+              </a:cxn>
+              <a:cxn ang="0">
+                <a:pos x="connsiteX11" y="connsiteY11"/>
+              </a:cxn>
+              <a:cxn ang="0">
+                <a:pos x="connsiteX12" y="connsiteY12"/>
+              </a:cxn>
+              <a:cxn ang="0">
+                <a:pos x="connsiteX13" y="connsiteY13"/>
+              </a:cxn>
+              <a:cxn ang="0">
+                <a:pos x="connsiteX14" y="connsiteY14"/>
+              </a:cxn>
+              <a:cxn ang="0">
+                <a:pos x="connsiteX15" y="connsiteY15"/>
+              </a:cxn>
+              <a:cxn ang="0">
+                <a:pos x="connsiteX16" y="connsiteY16"/>
+              </a:cxn>
+              <a:cxn ang="0">
+                <a:pos x="connsiteX17" y="connsiteY17"/>
+              </a:cxn>
+              <a:cxn ang="0">
+                <a:pos x="connsiteX18" y="connsiteY18"/>
+              </a:cxn>
+              <a:cxn ang="0">
+                <a:pos x="connsiteX19" y="connsiteY19"/>
+              </a:cxn>
+              <a:cxn ang="0">
+                <a:pos x="connsiteX20" y="connsiteY20"/>
+              </a:cxn>
+              <a:cxn ang="0">
+                <a:pos x="connsiteX21" y="connsiteY21"/>
+              </a:cxn>
+              <a:cxn ang="0">
+                <a:pos x="connsiteX22" y="connsiteY22"/>
+              </a:cxn>
+              <a:cxn ang="0">
+                <a:pos x="connsiteX23" y="connsiteY23"/>
+              </a:cxn>
+              <a:cxn ang="0">
+                <a:pos x="connsiteX24" y="connsiteY24"/>
+              </a:cxn>
+              <a:cxn ang="0">
+                <a:pos x="connsiteX25" y="connsiteY25"/>
+              </a:cxn>
+              <a:cxn ang="0">
+                <a:pos x="connsiteX26" y="connsiteY26"/>
+              </a:cxn>
+              <a:cxn ang="0">
+                <a:pos x="connsiteX27" y="connsiteY27"/>
+              </a:cxn>
+              <a:cxn ang="0">
+                <a:pos x="connsiteX28" y="connsiteY28"/>
+              </a:cxn>
+              <a:cxn ang="0">
+                <a:pos x="connsiteX29" y="connsiteY29"/>
+              </a:cxn>
+              <a:cxn ang="0">
+                <a:pos x="connsiteX30" y="connsiteY30"/>
+              </a:cxn>
+              <a:cxn ang="0">
+                <a:pos x="connsiteX31" y="connsiteY31"/>
+              </a:cxn>
+              <a:cxn ang="0">
+                <a:pos x="connsiteX32" y="connsiteY32"/>
+              </a:cxn>
+              <a:cxn ang="0">
+                <a:pos x="connsiteX33" y="connsiteY33"/>
+              </a:cxn>
+            </a:cxnLst>
+            <a:rect l="l" t="t" r="r" b="b"/>
+            <a:pathLst>
+              <a:path w="4015594" h="2285550">
+                <a:moveTo>
+                  <a:pt x="681898" y="2281741"/>
+                </a:moveTo>
+                <a:cubicBezTo>
+                  <a:pt x="730051" y="2284365"/>
+                  <a:pt x="870545" y="2285551"/>
+                  <a:pt x="870545" y="2285551"/>
+                </a:cubicBezTo>
+                <a:lnTo>
+                  <a:pt x="3444286" y="2285551"/>
+                </a:lnTo>
+                <a:cubicBezTo>
+                  <a:pt x="3761064" y="2284298"/>
+                  <a:pt x="4016848" y="2026480"/>
+                  <a:pt x="4015591" y="1709703"/>
+                </a:cubicBezTo>
+                <a:cubicBezTo>
+                  <a:pt x="4014352" y="1396554"/>
+                  <a:pt x="3762178" y="1142275"/>
+                  <a:pt x="3449048" y="1138436"/>
+                </a:cubicBezTo>
+                <a:lnTo>
+                  <a:pt x="3401423" y="1138436"/>
+                </a:lnTo>
+                <a:cubicBezTo>
+                  <a:pt x="3400980" y="907655"/>
+                  <a:pt x="3289266" y="691256"/>
+                  <a:pt x="3101386" y="557239"/>
+                </a:cubicBezTo>
+                <a:cubicBezTo>
+                  <a:pt x="2911034" y="424056"/>
+                  <a:pt x="2668303" y="390395"/>
+                  <a:pt x="2448890" y="466752"/>
+                </a:cubicBezTo>
+                <a:cubicBezTo>
+                  <a:pt x="2233454" y="45533"/>
+                  <a:pt x="1717337" y="-121288"/>
+                  <a:pt x="1296117" y="94148"/>
+                </a:cubicBezTo>
+                <a:cubicBezTo>
+                  <a:pt x="1011091" y="239928"/>
+                  <a:pt x="831140" y="532470"/>
+                  <a:pt x="829559" y="852610"/>
+                </a:cubicBezTo>
+                <a:lnTo>
+                  <a:pt x="829559" y="862135"/>
+                </a:lnTo>
+                <a:cubicBezTo>
+                  <a:pt x="792192" y="856020"/>
+                  <a:pt x="754397" y="852943"/>
+                  <a:pt x="716535" y="852929"/>
+                </a:cubicBezTo>
+                <a:cubicBezTo>
+                  <a:pt x="321262" y="852472"/>
+                  <a:pt x="460" y="1172531"/>
+                  <a:pt x="0" y="1567799"/>
+                </a:cubicBezTo>
+                <a:cubicBezTo>
+                  <a:pt x="-121" y="1672950"/>
+                  <a:pt x="22927" y="1776835"/>
+                  <a:pt x="67507" y="1872066"/>
+                </a:cubicBezTo>
+                <a:cubicBezTo>
+                  <a:pt x="183202" y="2109633"/>
+                  <a:pt x="418107" y="2266272"/>
+                  <a:pt x="681898" y="2281741"/>
+                </a:cubicBezTo>
+                <a:close/>
+                <a:moveTo>
+                  <a:pt x="219826" y="1195710"/>
+                </a:moveTo>
+                <a:cubicBezTo>
+                  <a:pt x="338650" y="1041376"/>
+                  <a:pt x="521740" y="950122"/>
+                  <a:pt x="716507" y="948169"/>
+                </a:cubicBezTo>
+                <a:cubicBezTo>
+                  <a:pt x="749211" y="948198"/>
+                  <a:pt x="781858" y="950855"/>
+                  <a:pt x="814138" y="956118"/>
+                </a:cubicBezTo>
+                <a:lnTo>
+                  <a:pt x="924776" y="974215"/>
+                </a:lnTo>
+                <a:lnTo>
+                  <a:pt x="924776" y="852591"/>
+                </a:lnTo>
+                <a:cubicBezTo>
+                  <a:pt x="927362" y="432019"/>
+                  <a:pt x="1270400" y="93181"/>
+                  <a:pt x="1690971" y="95767"/>
+                </a:cubicBezTo>
+                <a:cubicBezTo>
+                  <a:pt x="1975112" y="97515"/>
+                  <a:pt x="2234644" y="257311"/>
+                  <a:pt x="2364137" y="510238"/>
+                </a:cubicBezTo>
+                <a:lnTo>
+                  <a:pt x="2401960" y="583909"/>
+                </a:lnTo>
+                <a:lnTo>
+                  <a:pt x="2480170" y="556701"/>
+                </a:lnTo>
+                <a:cubicBezTo>
+                  <a:pt x="2801539" y="441806"/>
+                  <a:pt x="3155197" y="609179"/>
+                  <a:pt x="3270097" y="930548"/>
+                </a:cubicBezTo>
+                <a:cubicBezTo>
+                  <a:pt x="3293948" y="997261"/>
+                  <a:pt x="3306149" y="1067584"/>
+                  <a:pt x="3306169" y="1138436"/>
+                </a:cubicBezTo>
+                <a:lnTo>
+                  <a:pt x="3306169" y="1233686"/>
+                </a:lnTo>
+                <a:lnTo>
+                  <a:pt x="3449044" y="1233686"/>
+                </a:lnTo>
+                <a:cubicBezTo>
+                  <a:pt x="3713191" y="1237572"/>
+                  <a:pt x="3924179" y="1454856"/>
+                  <a:pt x="3920293" y="1719004"/>
+                </a:cubicBezTo>
+                <a:cubicBezTo>
+                  <a:pt x="3916459" y="1979527"/>
+                  <a:pt x="3704833" y="2189062"/>
+                  <a:pt x="3444286" y="2190301"/>
+                </a:cubicBezTo>
+                <a:lnTo>
+                  <a:pt x="771947" y="2190301"/>
+                </a:lnTo>
+                <a:lnTo>
+                  <a:pt x="687070" y="2186629"/>
+                </a:lnTo>
+                <a:cubicBezTo>
+                  <a:pt x="345651" y="2171908"/>
+                  <a:pt x="80810" y="1883200"/>
+                  <a:pt x="95530" y="1541782"/>
+                </a:cubicBezTo>
+                <a:cubicBezTo>
+                  <a:pt x="100932" y="1416495"/>
+                  <a:pt x="144273" y="1295808"/>
+                  <a:pt x="219811" y="1195710"/>
+                </a:cubicBezTo>
+                <a:close/>
+              </a:path>
+            </a:pathLst>
+          </a:custGeom>
+          <a:noFill/>
+          <a:ln w="6350" cap="flat">
+            <a:solidFill>
+              <a:schemeClr val="accent1"/>
+            </a:solidFill>
+            <a:prstDash val="solid"/>
+            <a:miter/>
+          </a:ln>
+        </p:spPr>
+        <p:txBody>
+          <a:bodyPr rtlCol="0" anchor="ctr"/>
+          <a:lstStyle/>
+          <a:p>
+            <a:endParaRPr lang="fr-CA"/>
+          </a:p>
+        </p:txBody>
+      </p:sp>
+      <p:cxnSp>
+        <p:nvCxnSpPr>
+          <p:cNvPr id="67" name="Connector: Curved 66">
+            <a:extLst>
+              <a:ext uri="{FF2B5EF4-FFF2-40B4-BE49-F238E27FC236}">
+                <a16:creationId xmlns:a16="http://schemas.microsoft.com/office/drawing/2014/main" id="{3CC4C0E7-8A33-456E-AB9A-19F7E746862F}"/>
+              </a:ext>
+            </a:extLst>
+          </p:cNvPr>
+          <p:cNvCxnSpPr>
+            <a:cxnSpLocks/>
+          </p:cNvCxnSpPr>
+          <p:nvPr/>
+        </p:nvCxnSpPr>
+        <p:spPr>
+          <a:xfrm rot="16200000" flipH="1">
+            <a:off x="3097219" y="2439308"/>
+            <a:ext cx="1063551" cy="2093899"/>
+          </a:xfrm>
+          <a:prstGeom prst="curvedConnector2">
+            <a:avLst/>
+          </a:prstGeom>
+          <a:ln>
+            <a:headEnd type="triangle"/>
+            <a:tailEnd type="triangle"/>
+          </a:ln>
+        </p:spPr>
+        <p:style>
+          <a:lnRef idx="1">
+            <a:schemeClr val="accent1"/>
+          </a:lnRef>
+          <a:fillRef idx="0">
+            <a:schemeClr val="accent1"/>
+          </a:fillRef>
+          <a:effectRef idx="0">
+            <a:schemeClr val="accent1"/>
+          </a:effectRef>
+          <a:fontRef idx="minor">
+            <a:schemeClr val="tx1"/>
+          </a:fontRef>
+        </p:style>
+      </p:cxnSp>
+      <p:cxnSp>
+        <p:nvCxnSpPr>
+          <p:cNvPr id="69" name="Connector: Curved 68">
+            <a:extLst>
+              <a:ext uri="{FF2B5EF4-FFF2-40B4-BE49-F238E27FC236}">
+                <a16:creationId xmlns:a16="http://schemas.microsoft.com/office/drawing/2014/main" id="{B868B35F-7240-464D-8632-09E3BE0AA964}"/>
+              </a:ext>
+            </a:extLst>
+          </p:cNvPr>
+          <p:cNvCxnSpPr>
+            <a:cxnSpLocks/>
+          </p:cNvCxnSpPr>
+          <p:nvPr/>
+        </p:nvCxnSpPr>
+        <p:spPr>
+          <a:xfrm rot="16200000" flipH="1">
+            <a:off x="2671813" y="2013902"/>
+            <a:ext cx="1063551" cy="2944712"/>
+          </a:xfrm>
+          <a:prstGeom prst="curvedConnector2">
+            <a:avLst/>
+          </a:prstGeom>
+          <a:ln>
+            <a:headEnd type="triangle"/>
+            <a:tailEnd type="triangle"/>
+          </a:ln>
+        </p:spPr>
+        <p:style>
+          <a:lnRef idx="1">
+            <a:schemeClr val="accent1"/>
+          </a:lnRef>
+          <a:fillRef idx="0">
+            <a:schemeClr val="accent1"/>
+          </a:fillRef>
+          <a:effectRef idx="0">
+            <a:schemeClr val="accent1"/>
+          </a:effectRef>
+          <a:fontRef idx="minor">
+            <a:schemeClr val="tx1"/>
+          </a:fontRef>
+        </p:style>
+      </p:cxnSp>
+      <p:cxnSp>
+        <p:nvCxnSpPr>
+          <p:cNvPr id="71" name="Connector: Curved 70">
+            <a:extLst>
+              <a:ext uri="{FF2B5EF4-FFF2-40B4-BE49-F238E27FC236}">
+                <a16:creationId xmlns:a16="http://schemas.microsoft.com/office/drawing/2014/main" id="{F4029B8D-7D2F-4A22-8BE2-A243426A9C77}"/>
+              </a:ext>
+            </a:extLst>
+          </p:cNvPr>
+          <p:cNvCxnSpPr>
+            <a:cxnSpLocks/>
+          </p:cNvCxnSpPr>
+          <p:nvPr/>
+        </p:nvCxnSpPr>
+        <p:spPr>
+          <a:xfrm rot="16200000" flipH="1">
+            <a:off x="2246406" y="1588495"/>
+            <a:ext cx="1063551" cy="3795525"/>
+          </a:xfrm>
+          <a:prstGeom prst="curvedConnector2">
+            <a:avLst/>
+          </a:prstGeom>
+          <a:ln>
+            <a:headEnd type="triangle"/>
+            <a:tailEnd type="triangle"/>
+          </a:ln>
+        </p:spPr>
+        <p:style>
+          <a:lnRef idx="1">
+            <a:schemeClr val="accent1"/>
+          </a:lnRef>
+          <a:fillRef idx="0">
+            <a:schemeClr val="accent1"/>
+          </a:fillRef>
+          <a:effectRef idx="0">
+            <a:schemeClr val="accent1"/>
+          </a:effectRef>
+          <a:fontRef idx="minor">
+            <a:schemeClr val="tx1"/>
+          </a:fontRef>
+        </p:style>
+      </p:cxnSp>
+      <p:cxnSp>
+        <p:nvCxnSpPr>
+          <p:cNvPr id="76" name="Connector: Curved 75">
+            <a:extLst>
+              <a:ext uri="{FF2B5EF4-FFF2-40B4-BE49-F238E27FC236}">
+                <a16:creationId xmlns:a16="http://schemas.microsoft.com/office/drawing/2014/main" id="{B0E96370-52C4-45E3-ABB7-F38BD45E9E71}"/>
+              </a:ext>
+            </a:extLst>
+          </p:cNvPr>
+          <p:cNvCxnSpPr>
+            <a:cxnSpLocks/>
+            <a:stCxn id="42" idx="3"/>
+            <a:endCxn id="138" idx="2"/>
+          </p:cNvCxnSpPr>
+          <p:nvPr/>
+        </p:nvCxnSpPr>
+        <p:spPr>
+          <a:xfrm flipV="1">
+            <a:off x="2177375" y="4616268"/>
+            <a:ext cx="2977202" cy="902133"/>
+          </a:xfrm>
+          <a:prstGeom prst="curvedConnector2">
+            <a:avLst/>
+          </a:prstGeom>
+          <a:ln>
+            <a:headEnd type="triangle"/>
+            <a:tailEnd type="triangle"/>
+          </a:ln>
+        </p:spPr>
+        <p:style>
+          <a:lnRef idx="1">
+            <a:schemeClr val="accent1"/>
+          </a:lnRef>
+          <a:fillRef idx="0">
+            <a:schemeClr val="accent1"/>
+          </a:fillRef>
+          <a:effectRef idx="0">
+            <a:schemeClr val="accent1"/>
+          </a:effectRef>
+          <a:fontRef idx="minor">
+            <a:schemeClr val="tx1"/>
+          </a:fontRef>
+        </p:style>
+      </p:cxnSp>
+      <p:sp>
+        <p:nvSpPr>
+          <p:cNvPr id="128" name="TextBox 127">
+            <a:extLst>
+              <a:ext uri="{FF2B5EF4-FFF2-40B4-BE49-F238E27FC236}">
+                <a16:creationId xmlns:a16="http://schemas.microsoft.com/office/drawing/2014/main" id="{AE1A24CB-D856-4574-A0B7-39AB7B963F94}"/>
+              </a:ext>
+            </a:extLst>
+          </p:cNvPr>
+          <p:cNvSpPr txBox="1"/>
+          <p:nvPr/>
+        </p:nvSpPr>
+        <p:spPr>
+          <a:xfrm>
+            <a:off x="3071166" y="2402717"/>
+            <a:ext cx="920830" cy="646331"/>
+          </a:xfrm>
+          <a:prstGeom prst="rect">
+            <a:avLst/>
+          </a:prstGeom>
+          <a:noFill/>
+        </p:spPr>
+        <p:txBody>
+          <a:bodyPr wrap="none" rtlCol="0">
+            <a:spAutoFit/>
+          </a:bodyPr>
+          <a:lstStyle/>
+          <a:p>
+            <a:r>
+              <a:rPr lang="fr-CA" dirty="0"/>
+              <a:t>Referee</a:t>
+            </a:r>
+            <a:br>
+              <a:rPr lang="fr-CA" dirty="0"/>
+            </a:br>
+            <a:r>
+              <a:rPr lang="fr-CA" dirty="0"/>
+              <a:t>Laptops</a:t>
+            </a:r>
+          </a:p>
+        </p:txBody>
+      </p:sp>
+      <p:sp>
+        <p:nvSpPr>
+          <p:cNvPr id="129" name="TextBox 128">
+            <a:extLst>
+              <a:ext uri="{FF2B5EF4-FFF2-40B4-BE49-F238E27FC236}">
+                <a16:creationId xmlns:a16="http://schemas.microsoft.com/office/drawing/2014/main" id="{BE5E34C6-8717-433B-8843-E4B12A7C146D}"/>
+              </a:ext>
+            </a:extLst>
+          </p:cNvPr>
+          <p:cNvSpPr txBox="1"/>
+          <p:nvPr/>
+        </p:nvSpPr>
+        <p:spPr>
+          <a:xfrm>
+            <a:off x="1257349" y="5790935"/>
+            <a:ext cx="996619" cy="369332"/>
+          </a:xfrm>
+          <a:prstGeom prst="rect">
+            <a:avLst/>
+          </a:prstGeom>
+          <a:noFill/>
+        </p:spPr>
+        <p:txBody>
+          <a:bodyPr wrap="none" rtlCol="0">
+            <a:spAutoFit/>
+          </a:bodyPr>
+          <a:lstStyle/>
+          <a:p>
+            <a:r>
+              <a:rPr lang="fr-CA" dirty="0"/>
+              <a:t>Marshall</a:t>
+            </a:r>
+          </a:p>
+        </p:txBody>
+      </p:sp>
+      <p:sp>
+        <p:nvSpPr>
+          <p:cNvPr id="130" name="TextBox 129">
+            <a:extLst>
+              <a:ext uri="{FF2B5EF4-FFF2-40B4-BE49-F238E27FC236}">
+                <a16:creationId xmlns:a16="http://schemas.microsoft.com/office/drawing/2014/main" id="{51255E3D-D65B-44CD-BE13-9BD3F23D006B}"/>
+              </a:ext>
+            </a:extLst>
+          </p:cNvPr>
+          <p:cNvSpPr txBox="1"/>
+          <p:nvPr/>
+        </p:nvSpPr>
+        <p:spPr>
+          <a:xfrm>
+            <a:off x="3160061" y="5997408"/>
+            <a:ext cx="1220206" cy="369332"/>
+          </a:xfrm>
+          <a:prstGeom prst="rect">
+            <a:avLst/>
+          </a:prstGeom>
+          <a:noFill/>
+        </p:spPr>
+        <p:txBody>
+          <a:bodyPr wrap="none" rtlCol="0">
+            <a:spAutoFit/>
+          </a:bodyPr>
+          <a:lstStyle/>
+          <a:p>
+            <a:r>
+              <a:rPr lang="fr-CA" dirty="0" err="1"/>
+              <a:t>Announcer</a:t>
+            </a:r>
+            <a:endParaRPr lang="fr-CA" dirty="0"/>
+          </a:p>
+        </p:txBody>
+      </p:sp>
+      <p:cxnSp>
+        <p:nvCxnSpPr>
+          <p:cNvPr id="135" name="Straight Arrow Connector 134">
+            <a:extLst>
+              <a:ext uri="{FF2B5EF4-FFF2-40B4-BE49-F238E27FC236}">
+                <a16:creationId xmlns:a16="http://schemas.microsoft.com/office/drawing/2014/main" id="{E3D4809F-46F2-45AB-9212-B21139D1E38C}"/>
+              </a:ext>
+            </a:extLst>
+          </p:cNvPr>
+          <p:cNvCxnSpPr>
+            <a:cxnSpLocks/>
+            <a:endCxn id="7" idx="1"/>
+          </p:cNvCxnSpPr>
+          <p:nvPr/>
+        </p:nvCxnSpPr>
+        <p:spPr>
+          <a:xfrm flipV="1">
+            <a:off x="5590344" y="4013534"/>
+            <a:ext cx="1428916" cy="4500"/>
+          </a:xfrm>
+          <a:prstGeom prst="straightConnector1">
+            <a:avLst/>
+          </a:prstGeom>
+          <a:ln w="53975">
+            <a:tailEnd type="triangle"/>
+          </a:ln>
+        </p:spPr>
+        <p:style>
+          <a:lnRef idx="1">
+            <a:schemeClr val="accent1"/>
+          </a:lnRef>
+          <a:fillRef idx="0">
+            <a:schemeClr val="accent1"/>
+          </a:fillRef>
+          <a:effectRef idx="0">
+            <a:schemeClr val="accent1"/>
+          </a:effectRef>
+          <a:fontRef idx="minor">
+            <a:schemeClr val="tx1"/>
+          </a:fontRef>
+        </p:style>
+      </p:cxnSp>
+      <p:pic>
+        <p:nvPicPr>
+          <p:cNvPr id="137" name="Graphic 136" descr="Laptop">
+            <a:extLst>
+              <a:ext uri="{FF2B5EF4-FFF2-40B4-BE49-F238E27FC236}">
+                <a16:creationId xmlns:a16="http://schemas.microsoft.com/office/drawing/2014/main" id="{1E7CC159-6195-4D7F-8385-60C99F5407AD}"/>
+              </a:ext>
+            </a:extLst>
+          </p:cNvPr>
+          <p:cNvPicPr>
+            <a:picLocks noChangeAspect="1"/>
+          </p:cNvPicPr>
+          <p:nvPr/>
+        </p:nvPicPr>
+        <p:blipFill>
+          <a:blip r:embed="rId8">
+            <a:extLst>
+              <a:ext uri="{28A0092B-C50C-407E-A947-70E740481C1C}">
+                <a14:useLocalDpi xmlns:a14="http://schemas.microsoft.com/office/drawing/2010/main" val="0"/>
+              </a:ext>
+              <a:ext uri="{96DAC541-7B7A-43D3-8B79-37D633B846F1}">
+                <asvg:svgBlip xmlns:asvg="http://schemas.microsoft.com/office/drawing/2016/SVG/main" r:embed="rId9"/>
+              </a:ext>
+            </a:extLst>
+          </a:blip>
+          <a:stretch>
+            <a:fillRect/>
+          </a:stretch>
+        </p:blipFill>
+        <p:spPr>
+          <a:xfrm>
+            <a:off x="3286094" y="5343835"/>
+            <a:ext cx="914400" cy="914400"/>
+          </a:xfrm>
+          <a:prstGeom prst="rect">
+            <a:avLst/>
+          </a:prstGeom>
+        </p:spPr>
+      </p:pic>
+      <p:sp>
+        <p:nvSpPr>
+          <p:cNvPr id="138" name="TextBox 137">
+            <a:extLst>
+              <a:ext uri="{FF2B5EF4-FFF2-40B4-BE49-F238E27FC236}">
+                <a16:creationId xmlns:a16="http://schemas.microsoft.com/office/drawing/2014/main" id="{79F9B87A-2C2D-43BA-8A3D-63A48FBE7D79}"/>
+              </a:ext>
+            </a:extLst>
+          </p:cNvPr>
+          <p:cNvSpPr txBox="1"/>
+          <p:nvPr/>
+        </p:nvSpPr>
+        <p:spPr>
+          <a:xfrm>
+            <a:off x="4706826" y="4246936"/>
+            <a:ext cx="895502" cy="369332"/>
+          </a:xfrm>
+          <a:prstGeom prst="rect">
+            <a:avLst/>
+          </a:prstGeom>
+          <a:noFill/>
+        </p:spPr>
+        <p:txBody>
+          <a:bodyPr wrap="none" rtlCol="0">
+            <a:spAutoFit/>
+          </a:bodyPr>
+          <a:lstStyle/>
+          <a:p>
+            <a:r>
+              <a:rPr lang="fr-CA" dirty="0"/>
+              <a:t>owlcms</a:t>
+            </a:r>
+          </a:p>
+        </p:txBody>
+      </p:sp>
+      <p:cxnSp>
+        <p:nvCxnSpPr>
+          <p:cNvPr id="140" name="Connector: Curved 139">
+            <a:extLst>
+              <a:ext uri="{FF2B5EF4-FFF2-40B4-BE49-F238E27FC236}">
+                <a16:creationId xmlns:a16="http://schemas.microsoft.com/office/drawing/2014/main" id="{0CD263EB-083B-46BB-903A-85F2EB299A85}"/>
+              </a:ext>
+            </a:extLst>
+          </p:cNvPr>
+          <p:cNvCxnSpPr>
+            <a:stCxn id="137" idx="3"/>
+            <a:endCxn id="138" idx="2"/>
+          </p:cNvCxnSpPr>
+          <p:nvPr/>
+        </p:nvCxnSpPr>
+        <p:spPr>
+          <a:xfrm flipV="1">
+            <a:off x="4200494" y="4616268"/>
+            <a:ext cx="954083" cy="1184767"/>
+          </a:xfrm>
+          <a:prstGeom prst="curvedConnector2">
+            <a:avLst/>
+          </a:prstGeom>
+          <a:ln>
+            <a:headEnd type="triangle"/>
+            <a:tailEnd type="triangle"/>
+          </a:ln>
+        </p:spPr>
+        <p:style>
+          <a:lnRef idx="1">
+            <a:schemeClr val="accent1"/>
+          </a:lnRef>
+          <a:fillRef idx="0">
+            <a:schemeClr val="accent1"/>
+          </a:fillRef>
+          <a:effectRef idx="0">
+            <a:schemeClr val="accent1"/>
+          </a:effectRef>
+          <a:fontRef idx="minor">
+            <a:schemeClr val="tx1"/>
+          </a:fontRef>
+        </p:style>
+      </p:cxnSp>
+      <p:sp>
+        <p:nvSpPr>
+          <p:cNvPr id="141" name="TextBox 140">
+            <a:extLst>
+              <a:ext uri="{FF2B5EF4-FFF2-40B4-BE49-F238E27FC236}">
+                <a16:creationId xmlns:a16="http://schemas.microsoft.com/office/drawing/2014/main" id="{FDFA73C4-2863-4475-A7A2-353585C96372}"/>
+              </a:ext>
+            </a:extLst>
+          </p:cNvPr>
+          <p:cNvSpPr txBox="1"/>
+          <p:nvPr/>
+        </p:nvSpPr>
+        <p:spPr>
+          <a:xfrm>
+            <a:off x="6787713" y="4356637"/>
+            <a:ext cx="1377493" cy="369332"/>
+          </a:xfrm>
+          <a:prstGeom prst="rect">
+            <a:avLst/>
+          </a:prstGeom>
+          <a:noFill/>
+        </p:spPr>
+        <p:txBody>
+          <a:bodyPr wrap="none" rtlCol="0">
+            <a:spAutoFit/>
+          </a:bodyPr>
+          <a:lstStyle/>
+          <a:p>
+            <a:r>
+              <a:rPr lang="fr-CA" dirty="0" err="1"/>
+              <a:t>publicresults</a:t>
+            </a:r>
+            <a:endParaRPr lang="fr-CA" dirty="0"/>
+          </a:p>
+        </p:txBody>
+      </p:sp>
+      <p:cxnSp>
+        <p:nvCxnSpPr>
+          <p:cNvPr id="143" name="Connector: Curved 142">
+            <a:extLst>
+              <a:ext uri="{FF2B5EF4-FFF2-40B4-BE49-F238E27FC236}">
+                <a16:creationId xmlns:a16="http://schemas.microsoft.com/office/drawing/2014/main" id="{EA06EC34-A278-408E-A58E-B30BBF510876}"/>
+              </a:ext>
+            </a:extLst>
+          </p:cNvPr>
+          <p:cNvCxnSpPr>
+            <a:stCxn id="7" idx="3"/>
+            <a:endCxn id="37" idx="3"/>
+          </p:cNvCxnSpPr>
+          <p:nvPr/>
+        </p:nvCxnSpPr>
+        <p:spPr>
+          <a:xfrm flipV="1">
+            <a:off x="7933660" y="1492572"/>
+            <a:ext cx="140430" cy="2520962"/>
+          </a:xfrm>
+          <a:prstGeom prst="curvedConnector3">
+            <a:avLst>
+              <a:gd name="adj1" fmla="val 262786"/>
+            </a:avLst>
+          </a:prstGeom>
+          <a:ln>
+            <a:tailEnd type="triangle"/>
+          </a:ln>
+        </p:spPr>
+        <p:style>
+          <a:lnRef idx="1">
+            <a:schemeClr val="accent1"/>
+          </a:lnRef>
+          <a:fillRef idx="0">
+            <a:schemeClr val="accent1"/>
+          </a:fillRef>
+          <a:effectRef idx="0">
+            <a:schemeClr val="accent1"/>
+          </a:effectRef>
+          <a:fontRef idx="minor">
+            <a:schemeClr val="tx1"/>
+          </a:fontRef>
+        </p:style>
+      </p:cxnSp>
+      <p:cxnSp>
+        <p:nvCxnSpPr>
+          <p:cNvPr id="145" name="Connector: Curved 144">
+            <a:extLst>
+              <a:ext uri="{FF2B5EF4-FFF2-40B4-BE49-F238E27FC236}">
+                <a16:creationId xmlns:a16="http://schemas.microsoft.com/office/drawing/2014/main" id="{A484415C-90E6-46A4-AADF-5FA10C8060A9}"/>
+              </a:ext>
+            </a:extLst>
+          </p:cNvPr>
+          <p:cNvCxnSpPr>
+            <a:stCxn id="7" idx="3"/>
+            <a:endCxn id="39" idx="3"/>
+          </p:cNvCxnSpPr>
+          <p:nvPr/>
+        </p:nvCxnSpPr>
+        <p:spPr>
+          <a:xfrm flipV="1">
+            <a:off x="7933660" y="1513306"/>
+            <a:ext cx="1758427" cy="2500228"/>
+          </a:xfrm>
+          <a:prstGeom prst="curvedConnector3">
+            <a:avLst>
+              <a:gd name="adj1" fmla="val 113000"/>
+            </a:avLst>
+          </a:prstGeom>
+          <a:ln>
+            <a:tailEnd type="triangle"/>
+          </a:ln>
+        </p:spPr>
+        <p:style>
+          <a:lnRef idx="1">
+            <a:schemeClr val="accent1"/>
+          </a:lnRef>
+          <a:fillRef idx="0">
+            <a:schemeClr val="accent1"/>
+          </a:fillRef>
+          <a:effectRef idx="0">
+            <a:schemeClr val="accent1"/>
+          </a:effectRef>
+          <a:fontRef idx="minor">
+            <a:schemeClr val="tx1"/>
+          </a:fontRef>
+        </p:style>
+      </p:cxnSp>
+      <p:cxnSp>
+        <p:nvCxnSpPr>
+          <p:cNvPr id="147" name="Connector: Curved 146">
+            <a:extLst>
+              <a:ext uri="{FF2B5EF4-FFF2-40B4-BE49-F238E27FC236}">
+                <a16:creationId xmlns:a16="http://schemas.microsoft.com/office/drawing/2014/main" id="{B989D948-7F2D-448F-A124-1CB1BA2F7C27}"/>
+              </a:ext>
+            </a:extLst>
+          </p:cNvPr>
+          <p:cNvCxnSpPr>
+            <a:stCxn id="7" idx="3"/>
+            <a:endCxn id="40" idx="3"/>
+          </p:cNvCxnSpPr>
+          <p:nvPr/>
+        </p:nvCxnSpPr>
+        <p:spPr>
+          <a:xfrm flipV="1">
+            <a:off x="7933660" y="1492572"/>
+            <a:ext cx="3376425" cy="2520962"/>
+          </a:xfrm>
+          <a:prstGeom prst="curvedConnector3">
+            <a:avLst>
+              <a:gd name="adj1" fmla="val 106770"/>
+            </a:avLst>
+          </a:prstGeom>
+          <a:ln>
+            <a:tailEnd type="triangle"/>
+          </a:ln>
+        </p:spPr>
+        <p:style>
+          <a:lnRef idx="1">
+            <a:schemeClr val="accent1"/>
+          </a:lnRef>
+          <a:fillRef idx="0">
+            <a:schemeClr val="accent1"/>
+          </a:fillRef>
+          <a:effectRef idx="0">
+            <a:schemeClr val="accent1"/>
+          </a:effectRef>
+          <a:fontRef idx="minor">
+            <a:schemeClr val="tx1"/>
+          </a:fontRef>
+        </p:style>
+      </p:cxnSp>
+      <p:sp>
+        <p:nvSpPr>
+          <p:cNvPr id="148" name="TextBox 147">
+            <a:extLst>
+              <a:ext uri="{FF2B5EF4-FFF2-40B4-BE49-F238E27FC236}">
+                <a16:creationId xmlns:a16="http://schemas.microsoft.com/office/drawing/2014/main" id="{5A244197-E699-467A-86C9-DD6E0E07D150}"/>
+              </a:ext>
+            </a:extLst>
+          </p:cNvPr>
+          <p:cNvSpPr txBox="1"/>
+          <p:nvPr/>
+        </p:nvSpPr>
+        <p:spPr>
+          <a:xfrm>
+            <a:off x="7210721" y="769313"/>
+            <a:ext cx="926857" cy="369332"/>
+          </a:xfrm>
+          <a:prstGeom prst="rect">
+            <a:avLst/>
+          </a:prstGeom>
+          <a:noFill/>
+        </p:spPr>
+        <p:txBody>
+          <a:bodyPr wrap="none" rtlCol="0">
+            <a:spAutoFit/>
+          </a:bodyPr>
+          <a:lstStyle/>
+          <a:p>
+            <a:r>
+              <a:rPr lang="fr-CA" i="1" dirty="0"/>
+              <a:t>Coach 1</a:t>
+            </a:r>
+          </a:p>
+        </p:txBody>
+      </p:sp>
+      <p:sp>
+        <p:nvSpPr>
+          <p:cNvPr id="149" name="TextBox 148">
+            <a:extLst>
+              <a:ext uri="{FF2B5EF4-FFF2-40B4-BE49-F238E27FC236}">
+                <a16:creationId xmlns:a16="http://schemas.microsoft.com/office/drawing/2014/main" id="{4FE2E93B-7061-4A86-A914-6E8C6F0BC6D2}"/>
+              </a:ext>
+            </a:extLst>
+          </p:cNvPr>
+          <p:cNvSpPr txBox="1"/>
+          <p:nvPr/>
+        </p:nvSpPr>
+        <p:spPr>
+          <a:xfrm>
+            <a:off x="8812873" y="769313"/>
+            <a:ext cx="926857" cy="369332"/>
+          </a:xfrm>
+          <a:prstGeom prst="rect">
+            <a:avLst/>
+          </a:prstGeom>
+          <a:noFill/>
+        </p:spPr>
+        <p:txBody>
+          <a:bodyPr wrap="none" rtlCol="0">
+            <a:spAutoFit/>
+          </a:bodyPr>
+          <a:lstStyle/>
+          <a:p>
+            <a:r>
+              <a:rPr lang="fr-CA" i="1" dirty="0"/>
+              <a:t>Coach 2</a:t>
+            </a:r>
+          </a:p>
+        </p:txBody>
+      </p:sp>
+      <p:sp>
+        <p:nvSpPr>
+          <p:cNvPr id="150" name="TextBox 149">
+            <a:extLst>
+              <a:ext uri="{FF2B5EF4-FFF2-40B4-BE49-F238E27FC236}">
+                <a16:creationId xmlns:a16="http://schemas.microsoft.com/office/drawing/2014/main" id="{468E77DA-A9D0-4A30-B55D-EB44D4712FA8}"/>
+              </a:ext>
+            </a:extLst>
+          </p:cNvPr>
+          <p:cNvSpPr txBox="1"/>
+          <p:nvPr/>
+        </p:nvSpPr>
+        <p:spPr>
+          <a:xfrm>
+            <a:off x="10430870" y="769313"/>
+            <a:ext cx="926857" cy="369332"/>
+          </a:xfrm>
+          <a:prstGeom prst="rect">
+            <a:avLst/>
+          </a:prstGeom>
+          <a:noFill/>
+        </p:spPr>
+        <p:txBody>
+          <a:bodyPr wrap="none" rtlCol="0">
+            <a:spAutoFit/>
+          </a:bodyPr>
+          <a:lstStyle/>
+          <a:p>
+            <a:r>
+              <a:rPr lang="fr-CA" i="1" dirty="0"/>
+              <a:t>Coach 3</a:t>
+            </a:r>
+          </a:p>
+        </p:txBody>
+      </p:sp>
+      <p:sp>
+        <p:nvSpPr>
+          <p:cNvPr id="41" name="TextBox 40">
+            <a:extLst>
+              <a:ext uri="{FF2B5EF4-FFF2-40B4-BE49-F238E27FC236}">
+                <a16:creationId xmlns:a16="http://schemas.microsoft.com/office/drawing/2014/main" id="{99CE7DB4-91D6-408C-A4F0-801DF23ED704}"/>
+              </a:ext>
+            </a:extLst>
+          </p:cNvPr>
+          <p:cNvSpPr txBox="1"/>
+          <p:nvPr/>
+        </p:nvSpPr>
+        <p:spPr>
+          <a:xfrm>
+            <a:off x="8046704" y="408838"/>
+            <a:ext cx="2314994" cy="369332"/>
+          </a:xfrm>
+          <a:prstGeom prst="rect">
+            <a:avLst/>
+          </a:prstGeom>
+          <a:noFill/>
+        </p:spPr>
+        <p:txBody>
+          <a:bodyPr wrap="none" rtlCol="0">
+            <a:spAutoFit/>
+          </a:bodyPr>
+          <a:lstStyle/>
+          <a:p>
+            <a:pPr algn="ctr"/>
+            <a:r>
+              <a:rPr lang="fr-CA" dirty="0" err="1"/>
+              <a:t>Individual</a:t>
+            </a:r>
+            <a:r>
+              <a:rPr lang="fr-CA" dirty="0"/>
+              <a:t> Scoreboards</a:t>
+            </a:r>
+          </a:p>
+        </p:txBody>
+      </p:sp>
+      <p:sp>
+        <p:nvSpPr>
+          <p:cNvPr id="36" name="TextBox 35">
+            <a:extLst>
+              <a:ext uri="{FF2B5EF4-FFF2-40B4-BE49-F238E27FC236}">
+                <a16:creationId xmlns:a16="http://schemas.microsoft.com/office/drawing/2014/main" id="{8C6D7954-666A-4DF3-9093-7064EA304C86}"/>
+              </a:ext>
+            </a:extLst>
+          </p:cNvPr>
+          <p:cNvSpPr txBox="1"/>
+          <p:nvPr/>
+        </p:nvSpPr>
+        <p:spPr>
+          <a:xfrm>
+            <a:off x="223805" y="438538"/>
+            <a:ext cx="2029530" cy="307777"/>
+          </a:xfrm>
+          <a:prstGeom prst="rect">
+            <a:avLst/>
+          </a:prstGeom>
+          <a:noFill/>
+        </p:spPr>
+        <p:txBody>
+          <a:bodyPr wrap="none" rtlCol="0">
+            <a:spAutoFit/>
+          </a:bodyPr>
+          <a:lstStyle/>
+          <a:p>
+            <a:r>
+              <a:rPr lang="fr-CA" sz="1400" i="1" dirty="0"/>
+              <a:t>Physical </a:t>
+            </a:r>
+            <a:r>
+              <a:rPr lang="fr-CA" sz="1400" i="1" dirty="0" err="1"/>
+              <a:t>Distancing</a:t>
+            </a:r>
+            <a:r>
+              <a:rPr lang="fr-CA" sz="1400" i="1" dirty="0"/>
+              <a:t> Setup</a:t>
+            </a:r>
+          </a:p>
+        </p:txBody>
+      </p:sp>
+      <p:sp>
+        <p:nvSpPr>
+          <p:cNvPr id="38" name="TextBox 37">
+            <a:extLst>
+              <a:ext uri="{FF2B5EF4-FFF2-40B4-BE49-F238E27FC236}">
+                <a16:creationId xmlns:a16="http://schemas.microsoft.com/office/drawing/2014/main" id="{85D3395D-CD82-483E-BCBD-91A39E12C604}"/>
+              </a:ext>
+            </a:extLst>
+          </p:cNvPr>
+          <p:cNvSpPr txBox="1"/>
+          <p:nvPr/>
+        </p:nvSpPr>
+        <p:spPr>
+          <a:xfrm>
+            <a:off x="5939427" y="3722914"/>
+            <a:ext cx="772584" cy="307777"/>
+          </a:xfrm>
+          <a:prstGeom prst="rect">
+            <a:avLst/>
+          </a:prstGeom>
+          <a:noFill/>
+        </p:spPr>
+        <p:txBody>
+          <a:bodyPr wrap="none" rtlCol="0">
+            <a:spAutoFit/>
+          </a:bodyPr>
+          <a:lstStyle/>
+          <a:p>
+            <a:r>
+              <a:rPr lang="fr-CA" sz="1400" dirty="0">
+                <a:solidFill>
+                  <a:schemeClr val="accent1"/>
+                </a:solidFill>
+              </a:rPr>
+              <a:t>updates</a:t>
+            </a:r>
+          </a:p>
+        </p:txBody>
+      </p:sp>
+      <p:pic>
+        <p:nvPicPr>
+          <p:cNvPr id="43" name="Graphic 42" descr="Laptop">
+            <a:extLst>
+              <a:ext uri="{FF2B5EF4-FFF2-40B4-BE49-F238E27FC236}">
+                <a16:creationId xmlns:a16="http://schemas.microsoft.com/office/drawing/2014/main" id="{2ACA3BDD-8AA0-4E6D-BF17-22728542DE3A}"/>
+              </a:ext>
+            </a:extLst>
+          </p:cNvPr>
+          <p:cNvPicPr>
+            <a:picLocks noChangeAspect="1"/>
+          </p:cNvPicPr>
+          <p:nvPr/>
+        </p:nvPicPr>
+        <p:blipFill>
+          <a:blip r:embed="rId8">
+            <a:extLst>
+              <a:ext uri="{28A0092B-C50C-407E-A947-70E740481C1C}">
+                <a14:useLocalDpi xmlns:a14="http://schemas.microsoft.com/office/drawing/2010/main" val="0"/>
+              </a:ext>
+              <a:ext uri="{96DAC541-7B7A-43D3-8B79-37D633B846F1}">
+                <asvg:svgBlip xmlns:asvg="http://schemas.microsoft.com/office/drawing/2016/SVG/main" r:embed="rId9"/>
+              </a:ext>
+            </a:extLst>
+          </a:blip>
+          <a:stretch>
+            <a:fillRect/>
+          </a:stretch>
+        </p:blipFill>
+        <p:spPr>
+          <a:xfrm>
+            <a:off x="429847" y="2134648"/>
+            <a:ext cx="914400" cy="914400"/>
+          </a:xfrm>
+          <a:prstGeom prst="rect">
+            <a:avLst/>
+          </a:prstGeom>
+        </p:spPr>
+      </p:pic>
+      <p:pic>
+        <p:nvPicPr>
+          <p:cNvPr id="45" name="Graphic 44" descr="Laptop">
+            <a:extLst>
+              <a:ext uri="{FF2B5EF4-FFF2-40B4-BE49-F238E27FC236}">
+                <a16:creationId xmlns:a16="http://schemas.microsoft.com/office/drawing/2014/main" id="{E66DC4D4-F79E-4DE2-8440-FFEBC59FBADF}"/>
+              </a:ext>
+            </a:extLst>
+          </p:cNvPr>
+          <p:cNvPicPr>
+            <a:picLocks noChangeAspect="1"/>
+          </p:cNvPicPr>
+          <p:nvPr/>
+        </p:nvPicPr>
+        <p:blipFill>
+          <a:blip r:embed="rId8">
+            <a:extLst>
+              <a:ext uri="{28A0092B-C50C-407E-A947-70E740481C1C}">
+                <a14:useLocalDpi xmlns:a14="http://schemas.microsoft.com/office/drawing/2010/main" val="0"/>
+              </a:ext>
+              <a:ext uri="{96DAC541-7B7A-43D3-8B79-37D633B846F1}">
+                <asvg:svgBlip xmlns:asvg="http://schemas.microsoft.com/office/drawing/2016/SVG/main" r:embed="rId9"/>
+              </a:ext>
+            </a:extLst>
+          </a:blip>
+          <a:stretch>
+            <a:fillRect/>
+          </a:stretch>
+        </p:blipFill>
+        <p:spPr>
+          <a:xfrm>
+            <a:off x="1300797" y="2134648"/>
+            <a:ext cx="914400" cy="914400"/>
+          </a:xfrm>
+          <a:prstGeom prst="rect">
+            <a:avLst/>
+          </a:prstGeom>
+        </p:spPr>
+      </p:pic>
+      <p:pic>
+        <p:nvPicPr>
+          <p:cNvPr id="46" name="Graphic 45" descr="Laptop">
+            <a:extLst>
+              <a:ext uri="{FF2B5EF4-FFF2-40B4-BE49-F238E27FC236}">
+                <a16:creationId xmlns:a16="http://schemas.microsoft.com/office/drawing/2014/main" id="{DBC6A279-F374-473E-9C8E-6201FB80BC62}"/>
+              </a:ext>
+            </a:extLst>
+          </p:cNvPr>
+          <p:cNvPicPr>
+            <a:picLocks noChangeAspect="1"/>
+          </p:cNvPicPr>
+          <p:nvPr/>
+        </p:nvPicPr>
+        <p:blipFill>
+          <a:blip r:embed="rId8">
+            <a:extLst>
+              <a:ext uri="{28A0092B-C50C-407E-A947-70E740481C1C}">
+                <a14:useLocalDpi xmlns:a14="http://schemas.microsoft.com/office/drawing/2010/main" val="0"/>
+              </a:ext>
+              <a:ext uri="{96DAC541-7B7A-43D3-8B79-37D633B846F1}">
+                <asvg:svgBlip xmlns:asvg="http://schemas.microsoft.com/office/drawing/2016/SVG/main" r:embed="rId9"/>
+              </a:ext>
+            </a:extLst>
+          </a:blip>
+          <a:stretch>
+            <a:fillRect/>
+          </a:stretch>
+        </p:blipFill>
+        <p:spPr>
+          <a:xfrm>
+            <a:off x="2171747" y="2134648"/>
+            <a:ext cx="914400" cy="914400"/>
+          </a:xfrm>
+          <a:prstGeom prst="rect">
+            <a:avLst/>
+          </a:prstGeom>
+        </p:spPr>
+      </p:pic>
+    </p:spTree>
+    <p:extLst>
+      <p:ext uri="{BB962C8B-B14F-4D97-AF65-F5344CB8AC3E}">
+        <p14:creationId xmlns:p14="http://schemas.microsoft.com/office/powerpoint/2010/main" val="606038545"/>
+      </p:ext>
+    </p:extLst>
+  </p:cSld>
+  <p:clrMapOvr>
+    <a:masterClrMapping/>
+  </p:clrMapOvr>
+</p:sld>
+</file>
+
 <file path=ppt/slides/slide2.xml><?xml version="1.0" encoding="utf-8"?>
 <p:sld xmlns:a="http://schemas.openxmlformats.org/drawingml/2006/main" xmlns:r="http://schemas.openxmlformats.org/officeDocument/2006/relationships" xmlns:p="http://schemas.openxmlformats.org/presentationml/2006/main">
   <p:cSld>

</xml_diff>